<commit_message>
subdiv similarity section done
</commit_message>
<xml_diff>
--- a/poster/poster.pptx
+++ b/poster/poster.pptx
@@ -4171,6 +4171,135 @@
           <a:chExt cx="0" cy="0"/>
         </a:xfrm>
       </p:grpSpPr>
+      <p:pic>
+        <p:nvPicPr>
+          <p:cNvPr id="113" name="Picture 112"/>
+          <p:cNvPicPr>
+            <a:picLocks noChangeAspect="1"/>
+          </p:cNvPicPr>
+          <p:nvPr/>
+        </p:nvPicPr>
+        <p:blipFill>
+          <a:blip r:embed="rId3">
+            <a:extLst>
+              <a:ext uri="{28A0092B-C50C-407E-A947-70E740481C1C}">
+                <a14:useLocalDpi xmlns:a14="http://schemas.microsoft.com/office/drawing/2010/main" val="0"/>
+              </a:ext>
+            </a:extLst>
+          </a:blip>
+          <a:stretch>
+            <a:fillRect/>
+          </a:stretch>
+        </p:blipFill>
+        <p:spPr>
+          <a:xfrm>
+            <a:off x="19545300" y="20858768"/>
+            <a:ext cx="7315200" cy="3222158"/>
+          </a:xfrm>
+          <a:prstGeom prst="rect">
+            <a:avLst/>
+          </a:prstGeom>
+        </p:spPr>
+      </p:pic>
+      <p:sp>
+        <p:nvSpPr>
+          <p:cNvPr id="100" name="TextBox 99"/>
+          <p:cNvSpPr txBox="1"/>
+          <p:nvPr/>
+        </p:nvSpPr>
+        <p:spPr>
+          <a:xfrm>
+            <a:off x="21857296" y="21037954"/>
+            <a:ext cx="3235570" cy="830997"/>
+          </a:xfrm>
+          <a:prstGeom prst="rect">
+            <a:avLst/>
+          </a:prstGeom>
+          <a:noFill/>
+        </p:spPr>
+        <p:txBody>
+          <a:bodyPr wrap="square" rtlCol="0">
+            <a:spAutoFit/>
+          </a:bodyPr>
+          <a:lstStyle/>
+          <a:p>
+            <a:pPr algn="ctr"/>
+            <a:r>
+              <a:rPr lang="en-US" sz="2400" dirty="0" smtClean="0">
+                <a:latin typeface="Calibri" charset="0"/>
+                <a:ea typeface="Calibri" charset="0"/>
+                <a:cs typeface="Calibri" charset="0"/>
+              </a:rPr>
+              <a:t>Global Defect Distribution </a:t>
+            </a:r>
+            <a:endParaRPr lang="en-US" sz="2400" dirty="0">
+              <a:latin typeface="Calibri" charset="0"/>
+              <a:ea typeface="Calibri" charset="0"/>
+              <a:cs typeface="Calibri" charset="0"/>
+            </a:endParaRPr>
+          </a:p>
+        </p:txBody>
+      </p:sp>
+      <p:pic>
+        <p:nvPicPr>
+          <p:cNvPr id="123" name="Picture 122"/>
+          <p:cNvPicPr>
+            <a:picLocks/>
+          </p:cNvPicPr>
+          <p:nvPr/>
+        </p:nvPicPr>
+        <p:blipFill>
+          <a:blip r:embed="rId4">
+            <a:extLst>
+              <a:ext uri="{28A0092B-C50C-407E-A947-70E740481C1C}">
+                <a14:useLocalDpi xmlns:a14="http://schemas.microsoft.com/office/drawing/2010/main" val="0"/>
+              </a:ext>
+            </a:extLst>
+          </a:blip>
+          <a:stretch>
+            <a:fillRect/>
+          </a:stretch>
+        </p:blipFill>
+        <p:spPr>
+          <a:xfrm>
+            <a:off x="14229196" y="23544983"/>
+            <a:ext cx="4923498" cy="7034781"/>
+          </a:xfrm>
+          <a:prstGeom prst="rect">
+            <a:avLst/>
+          </a:prstGeom>
+        </p:spPr>
+      </p:pic>
+      <p:pic>
+        <p:nvPicPr>
+          <p:cNvPr id="115" name="Picture 114"/>
+          <p:cNvPicPr>
+            <a:picLocks noChangeAspect="1"/>
+          </p:cNvPicPr>
+          <p:nvPr/>
+        </p:nvPicPr>
+        <p:blipFill>
+          <a:blip r:embed="rId5">
+            <a:extLst>
+              <a:ext uri="{28A0092B-C50C-407E-A947-70E740481C1C}">
+                <a14:useLocalDpi xmlns:a14="http://schemas.microsoft.com/office/drawing/2010/main" val="0"/>
+              </a:ext>
+            </a:extLst>
+          </a:blip>
+          <a:stretch>
+            <a:fillRect/>
+          </a:stretch>
+        </p:blipFill>
+        <p:spPr>
+          <a:xfrm>
+            <a:off x="12930883" y="30807454"/>
+            <a:ext cx="7579758" cy="5211084"/>
+          </a:xfrm>
+          <a:prstGeom prst="rect">
+            <a:avLst/>
+          </a:prstGeom>
+        </p:spPr>
+      </p:pic>
       <p:sp>
         <p:nvSpPr>
           <p:cNvPr id="109" name="Rectangle 108"/>
@@ -4632,7 +4761,7 @@
           <p:nvPr/>
         </p:nvPicPr>
         <p:blipFill>
-          <a:blip r:embed="rId3" cstate="print"/>
+          <a:blip r:embed="rId6" cstate="print"/>
           <a:srcRect/>
           <a:stretch>
             <a:fillRect/>
@@ -5120,7 +5249,7 @@
           <p:nvPr/>
         </p:nvPicPr>
         <p:blipFill>
-          <a:blip r:embed="rId4"/>
+          <a:blip r:embed="rId7"/>
           <a:stretch>
             <a:fillRect/>
           </a:stretch>
@@ -5370,7 +5499,7 @@
           <p:nvPr/>
         </p:nvPicPr>
         <p:blipFill>
-          <a:blip r:embed="rId5"/>
+          <a:blip r:embed="rId8"/>
           <a:stretch>
             <a:fillRect/>
           </a:stretch>
@@ -5802,7 +5931,7 @@
                 <a:ea typeface="Calibri" charset="0"/>
                 <a:cs typeface="Calibri" charset="0"/>
               </a:rPr>
-              <a:t>Classification Results</a:t>
+              <a:t>Predicting Defect Types</a:t>
             </a:r>
             <a:endParaRPr lang="en-US" sz="7200" dirty="0">
               <a:latin typeface="Calibri" charset="0"/>
@@ -5899,7 +6028,7 @@
                 <a:ea typeface="Calibri" charset="0"/>
                 <a:cs typeface="Calibri" charset="0"/>
               </a:rPr>
-              <a:t>Clustering Results</a:t>
+              <a:t>Subdivision Similarity Analysis</a:t>
             </a:r>
             <a:endParaRPr lang="en-US" sz="7200" dirty="0">
               <a:latin typeface="Calibri" charset="0"/>
@@ -5956,54 +6085,6 @@
       </p:sp>
       <p:sp>
         <p:nvSpPr>
-          <p:cNvPr id="37" name="TextBox 36"/>
-          <p:cNvSpPr txBox="1"/>
-          <p:nvPr/>
-        </p:nvSpPr>
-        <p:spPr>
-          <a:xfrm>
-            <a:off x="13920052" y="21277733"/>
-            <a:ext cx="12734827" cy="1754326"/>
-          </a:xfrm>
-          <a:prstGeom prst="rect">
-            <a:avLst/>
-          </a:prstGeom>
-          <a:noFill/>
-        </p:spPr>
-        <p:txBody>
-          <a:bodyPr wrap="square" rtlCol="0">
-            <a:spAutoFit/>
-          </a:bodyPr>
-          <a:lstStyle/>
-          <a:p>
-            <a:r>
-              <a:rPr lang="en-US" sz="3600" dirty="0" smtClean="0">
-                <a:latin typeface="Calibri" charset="0"/>
-                <a:ea typeface="Calibri" charset="0"/>
-                <a:cs typeface="Calibri" charset="0"/>
-              </a:rPr>
-              <a:t>Central Question:</a:t>
-            </a:r>
-          </a:p>
-          <a:p>
-            <a:r>
-              <a:rPr lang="en-US" sz="3600" dirty="0" smtClean="0">
-                <a:latin typeface="Calibri" charset="0"/>
-                <a:ea typeface="Calibri" charset="0"/>
-                <a:cs typeface="Calibri" charset="0"/>
-              </a:rPr>
-              <a:t>Can we identify regions of track that are similar in terms of their defects?</a:t>
-            </a:r>
-            <a:endParaRPr lang="en-US" sz="3600" dirty="0">
-              <a:latin typeface="Calibri" charset="0"/>
-              <a:ea typeface="Calibri" charset="0"/>
-              <a:cs typeface="Calibri" charset="0"/>
-            </a:endParaRPr>
-          </a:p>
-        </p:txBody>
-      </p:sp>
-      <p:sp>
-        <p:nvSpPr>
           <p:cNvPr id="48" name="TextBox 47"/>
           <p:cNvSpPr txBox="1"/>
           <p:nvPr/>
@@ -6233,7 +6314,7 @@
           <p:nvPr/>
         </p:nvPicPr>
         <p:blipFill>
-          <a:blip r:embed="rId6">
+          <a:blip r:embed="rId9">
             <a:extLst>
               <a:ext uri="{28A0092B-C50C-407E-A947-70E740481C1C}">
                 <a14:useLocalDpi xmlns:a14="http://schemas.microsoft.com/office/drawing/2010/main" val="0"/>
@@ -8021,6 +8102,974 @@
           </p:txBody>
         </p:sp>
       </p:grpSp>
+      <p:pic>
+        <p:nvPicPr>
+          <p:cNvPr id="112" name="Picture 111"/>
+          <p:cNvPicPr>
+            <a:picLocks/>
+          </p:cNvPicPr>
+          <p:nvPr/>
+        </p:nvPicPr>
+        <p:blipFill>
+          <a:blip r:embed="rId4">
+            <a:extLst>
+              <a:ext uri="{28A0092B-C50C-407E-A947-70E740481C1C}">
+                <a14:useLocalDpi xmlns:a14="http://schemas.microsoft.com/office/drawing/2010/main" val="0"/>
+              </a:ext>
+            </a:extLst>
+          </a:blip>
+          <a:stretch>
+            <a:fillRect/>
+          </a:stretch>
+        </p:blipFill>
+        <p:spPr>
+          <a:xfrm>
+            <a:off x="32933151" y="30150023"/>
+            <a:ext cx="4923498" cy="4895153"/>
+          </a:xfrm>
+          <a:prstGeom prst="rect">
+            <a:avLst/>
+          </a:prstGeom>
+        </p:spPr>
+      </p:pic>
+      <p:sp>
+        <p:nvSpPr>
+          <p:cNvPr id="119" name="Rectangle 118"/>
+          <p:cNvSpPr/>
+          <p:nvPr/>
+        </p:nvSpPr>
+        <p:spPr>
+          <a:xfrm>
+            <a:off x="16411206" y="24164036"/>
+            <a:ext cx="559477" cy="286653"/>
+          </a:xfrm>
+          <a:prstGeom prst="rect">
+            <a:avLst/>
+          </a:prstGeom>
+          <a:noFill/>
+          <a:ln w="50800">
+            <a:solidFill>
+              <a:schemeClr val="accent2"/>
+            </a:solidFill>
+          </a:ln>
+          <a:effectLst>
+            <a:glow rad="228600">
+              <a:schemeClr val="accent2">
+                <a:satMod val="175000"/>
+                <a:alpha val="40000"/>
+              </a:schemeClr>
+            </a:glow>
+          </a:effectLst>
+        </p:spPr>
+        <p:style>
+          <a:lnRef idx="2">
+            <a:schemeClr val="accent1">
+              <a:shade val="50000"/>
+            </a:schemeClr>
+          </a:lnRef>
+          <a:fillRef idx="1">
+            <a:schemeClr val="accent1"/>
+          </a:fillRef>
+          <a:effectRef idx="0">
+            <a:schemeClr val="accent1"/>
+          </a:effectRef>
+          <a:fontRef idx="minor">
+            <a:schemeClr val="lt1"/>
+          </a:fontRef>
+        </p:style>
+        <p:txBody>
+          <a:bodyPr rtlCol="0" anchor="ctr"/>
+          <a:lstStyle/>
+          <a:p>
+            <a:pPr algn="ctr"/>
+            <a:endParaRPr lang="en-US"/>
+          </a:p>
+        </p:txBody>
+      </p:sp>
+      <p:sp>
+        <p:nvSpPr>
+          <p:cNvPr id="122" name="Rectangle 121"/>
+          <p:cNvSpPr/>
+          <p:nvPr/>
+        </p:nvSpPr>
+        <p:spPr>
+          <a:xfrm>
+            <a:off x="15813130" y="27373958"/>
+            <a:ext cx="1063785" cy="886515"/>
+          </a:xfrm>
+          <a:prstGeom prst="rect">
+            <a:avLst/>
+          </a:prstGeom>
+          <a:noFill/>
+          <a:ln w="50800">
+            <a:solidFill>
+              <a:schemeClr val="accent2"/>
+            </a:solidFill>
+          </a:ln>
+          <a:effectLst>
+            <a:glow rad="228600">
+              <a:schemeClr val="accent2">
+                <a:satMod val="175000"/>
+                <a:alpha val="40000"/>
+              </a:schemeClr>
+            </a:glow>
+          </a:effectLst>
+        </p:spPr>
+        <p:style>
+          <a:lnRef idx="2">
+            <a:schemeClr val="accent1">
+              <a:shade val="50000"/>
+            </a:schemeClr>
+          </a:lnRef>
+          <a:fillRef idx="1">
+            <a:schemeClr val="accent1"/>
+          </a:fillRef>
+          <a:effectRef idx="0">
+            <a:schemeClr val="accent1"/>
+          </a:effectRef>
+          <a:fontRef idx="minor">
+            <a:schemeClr val="lt1"/>
+          </a:fontRef>
+        </p:style>
+        <p:txBody>
+          <a:bodyPr rtlCol="0" anchor="ctr"/>
+          <a:lstStyle/>
+          <a:p>
+            <a:pPr algn="ctr"/>
+            <a:endParaRPr lang="en-US"/>
+          </a:p>
+        </p:txBody>
+      </p:sp>
+      <p:sp>
+        <p:nvSpPr>
+          <p:cNvPr id="6" name="Right Arrow 5"/>
+          <p:cNvSpPr/>
+          <p:nvPr/>
+        </p:nvSpPr>
+        <p:spPr>
+          <a:xfrm>
+            <a:off x="17331522" y="24307362"/>
+            <a:ext cx="2054419" cy="250511"/>
+          </a:xfrm>
+          <a:prstGeom prst="rightArrow">
+            <a:avLst/>
+          </a:prstGeom>
+          <a:solidFill>
+            <a:schemeClr val="accent2"/>
+          </a:solidFill>
+          <a:ln>
+            <a:solidFill>
+              <a:schemeClr val="accent2"/>
+            </a:solidFill>
+          </a:ln>
+        </p:spPr>
+        <p:style>
+          <a:lnRef idx="2">
+            <a:schemeClr val="accent1">
+              <a:shade val="50000"/>
+            </a:schemeClr>
+          </a:lnRef>
+          <a:fillRef idx="1">
+            <a:schemeClr val="accent1"/>
+          </a:fillRef>
+          <a:effectRef idx="0">
+            <a:schemeClr val="accent1"/>
+          </a:effectRef>
+          <a:fontRef idx="minor">
+            <a:schemeClr val="lt1"/>
+          </a:fontRef>
+        </p:style>
+        <p:txBody>
+          <a:bodyPr rtlCol="0" anchor="ctr"/>
+          <a:lstStyle/>
+          <a:p>
+            <a:pPr algn="ctr"/>
+            <a:endParaRPr lang="en-US"/>
+          </a:p>
+        </p:txBody>
+      </p:sp>
+      <p:sp>
+        <p:nvSpPr>
+          <p:cNvPr id="83" name="Right Arrow 82"/>
+          <p:cNvSpPr/>
+          <p:nvPr/>
+        </p:nvSpPr>
+        <p:spPr>
+          <a:xfrm rot="1080000">
+            <a:off x="16948071" y="28572760"/>
+            <a:ext cx="2152827" cy="381026"/>
+          </a:xfrm>
+          <a:prstGeom prst="rightArrow">
+            <a:avLst/>
+          </a:prstGeom>
+          <a:solidFill>
+            <a:schemeClr val="accent2"/>
+          </a:solidFill>
+          <a:ln>
+            <a:solidFill>
+              <a:schemeClr val="accent2"/>
+            </a:solidFill>
+          </a:ln>
+        </p:spPr>
+        <p:style>
+          <a:lnRef idx="2">
+            <a:schemeClr val="accent1">
+              <a:shade val="50000"/>
+            </a:schemeClr>
+          </a:lnRef>
+          <a:fillRef idx="1">
+            <a:schemeClr val="accent1"/>
+          </a:fillRef>
+          <a:effectRef idx="0">
+            <a:schemeClr val="accent1"/>
+          </a:effectRef>
+          <a:fontRef idx="minor">
+            <a:schemeClr val="lt1"/>
+          </a:fontRef>
+        </p:style>
+        <p:txBody>
+          <a:bodyPr rtlCol="0" anchor="ctr"/>
+          <a:lstStyle/>
+          <a:p>
+            <a:pPr algn="ctr"/>
+            <a:endParaRPr lang="en-US"/>
+          </a:p>
+        </p:txBody>
+      </p:sp>
+      <p:sp>
+        <p:nvSpPr>
+          <p:cNvPr id="8" name="TextBox 7"/>
+          <p:cNvSpPr txBox="1"/>
+          <p:nvPr/>
+        </p:nvSpPr>
+        <p:spPr>
+          <a:xfrm>
+            <a:off x="14474361" y="27474406"/>
+            <a:ext cx="1371599" cy="830997"/>
+          </a:xfrm>
+          <a:prstGeom prst="rect">
+            <a:avLst/>
+          </a:prstGeom>
+          <a:noFill/>
+        </p:spPr>
+        <p:txBody>
+          <a:bodyPr wrap="square" rtlCol="0">
+            <a:spAutoFit/>
+          </a:bodyPr>
+          <a:lstStyle/>
+          <a:p>
+            <a:r>
+              <a:rPr lang="en-US" sz="2400" dirty="0" smtClean="0">
+                <a:latin typeface="Calibri" charset="0"/>
+                <a:ea typeface="Calibri" charset="0"/>
+                <a:cs typeface="Calibri" charset="0"/>
+              </a:rPr>
+              <a:t>Eastern Kentucky</a:t>
+            </a:r>
+            <a:endParaRPr lang="en-US" sz="2400" dirty="0">
+              <a:latin typeface="Calibri" charset="0"/>
+              <a:ea typeface="Calibri" charset="0"/>
+              <a:cs typeface="Calibri" charset="0"/>
+            </a:endParaRPr>
+          </a:p>
+        </p:txBody>
+      </p:sp>
+      <p:sp>
+        <p:nvSpPr>
+          <p:cNvPr id="97" name="TextBox 96"/>
+          <p:cNvSpPr txBox="1"/>
+          <p:nvPr/>
+        </p:nvSpPr>
+        <p:spPr>
+          <a:xfrm>
+            <a:off x="15089032" y="23780657"/>
+            <a:ext cx="1371599" cy="461665"/>
+          </a:xfrm>
+          <a:prstGeom prst="rect">
+            <a:avLst/>
+          </a:prstGeom>
+          <a:noFill/>
+        </p:spPr>
+        <p:txBody>
+          <a:bodyPr wrap="square" rtlCol="0">
+            <a:spAutoFit/>
+          </a:bodyPr>
+          <a:lstStyle/>
+          <a:p>
+            <a:r>
+              <a:rPr lang="en-US" sz="2400" dirty="0" smtClean="0">
+                <a:latin typeface="Calibri" charset="0"/>
+                <a:ea typeface="Calibri" charset="0"/>
+                <a:cs typeface="Calibri" charset="0"/>
+              </a:rPr>
+              <a:t>Fostoria</a:t>
+            </a:r>
+            <a:endParaRPr lang="en-US" sz="2400" dirty="0">
+              <a:latin typeface="Calibri" charset="0"/>
+              <a:ea typeface="Calibri" charset="0"/>
+              <a:cs typeface="Calibri" charset="0"/>
+            </a:endParaRPr>
+          </a:p>
+        </p:txBody>
+      </p:sp>
+      <p:grpSp>
+        <p:nvGrpSpPr>
+          <p:cNvPr id="26" name="Group 25"/>
+          <p:cNvGrpSpPr/>
+          <p:nvPr/>
+        </p:nvGrpSpPr>
+        <p:grpSpPr>
+          <a:xfrm>
+            <a:off x="19152694" y="28203873"/>
+            <a:ext cx="7808377" cy="3015422"/>
+            <a:chOff x="19108821" y="28943297"/>
+            <a:chExt cx="7808377" cy="3015422"/>
+          </a:xfrm>
+        </p:grpSpPr>
+        <p:pic>
+          <p:nvPicPr>
+            <p:cNvPr id="3" name="Picture 2"/>
+            <p:cNvPicPr>
+              <a:picLocks/>
+            </p:cNvPicPr>
+            <p:nvPr/>
+          </p:nvPicPr>
+          <p:blipFill>
+            <a:blip r:embed="rId10">
+              <a:extLst>
+                <a:ext uri="{28A0092B-C50C-407E-A947-70E740481C1C}">
+                  <a14:useLocalDpi xmlns:a14="http://schemas.microsoft.com/office/drawing/2010/main" val="0"/>
+                </a:ext>
+              </a:extLst>
+            </a:blip>
+            <a:stretch>
+              <a:fillRect/>
+            </a:stretch>
+          </p:blipFill>
+          <p:spPr>
+            <a:xfrm>
+              <a:off x="19108821" y="28943297"/>
+              <a:ext cx="7808377" cy="3015422"/>
+            </a:xfrm>
+            <a:prstGeom prst="rect">
+              <a:avLst/>
+            </a:prstGeom>
+          </p:spPr>
+        </p:pic>
+        <p:sp>
+          <p:nvSpPr>
+            <p:cNvPr id="98" name="TextBox 97"/>
+            <p:cNvSpPr txBox="1"/>
+            <p:nvPr/>
+          </p:nvSpPr>
+          <p:spPr>
+            <a:xfrm>
+              <a:off x="22066994" y="29309004"/>
+              <a:ext cx="2679424" cy="830997"/>
+            </a:xfrm>
+            <a:prstGeom prst="rect">
+              <a:avLst/>
+            </a:prstGeom>
+            <a:noFill/>
+          </p:spPr>
+          <p:txBody>
+            <a:bodyPr wrap="square" rtlCol="0">
+              <a:spAutoFit/>
+            </a:bodyPr>
+            <a:lstStyle/>
+            <a:p>
+              <a:pPr algn="ctr"/>
+              <a:r>
+                <a:rPr lang="en-US" sz="2400" dirty="0" smtClean="0">
+                  <a:latin typeface="Calibri" charset="0"/>
+                  <a:ea typeface="Calibri" charset="0"/>
+                  <a:cs typeface="Calibri" charset="0"/>
+                </a:rPr>
+                <a:t>Eastern Kentucky</a:t>
+              </a:r>
+              <a:br>
+                <a:rPr lang="en-US" sz="2400" dirty="0" smtClean="0">
+                  <a:latin typeface="Calibri" charset="0"/>
+                  <a:ea typeface="Calibri" charset="0"/>
+                  <a:cs typeface="Calibri" charset="0"/>
+                </a:rPr>
+              </a:br>
+              <a:r>
+                <a:rPr lang="en-US" sz="2400" dirty="0" smtClean="0">
+                  <a:latin typeface="Calibri" charset="0"/>
+                  <a:ea typeface="Calibri" charset="0"/>
+                  <a:cs typeface="Calibri" charset="0"/>
+                </a:rPr>
+                <a:t>Defect Distribution</a:t>
+              </a:r>
+              <a:endParaRPr lang="en-US" sz="2400" dirty="0">
+                <a:latin typeface="Calibri" charset="0"/>
+                <a:ea typeface="Calibri" charset="0"/>
+                <a:cs typeface="Calibri" charset="0"/>
+              </a:endParaRPr>
+            </a:p>
+          </p:txBody>
+        </p:sp>
+      </p:grpSp>
+      <p:grpSp>
+        <p:nvGrpSpPr>
+          <p:cNvPr id="23" name="Group 22"/>
+          <p:cNvGrpSpPr/>
+          <p:nvPr/>
+        </p:nvGrpSpPr>
+        <p:grpSpPr>
+          <a:xfrm>
+            <a:off x="19393369" y="23777604"/>
+            <a:ext cx="7315200" cy="2022570"/>
+            <a:chOff x="19388797" y="26708690"/>
+            <a:chExt cx="7315200" cy="2022570"/>
+          </a:xfrm>
+        </p:grpSpPr>
+        <p:pic>
+          <p:nvPicPr>
+            <p:cNvPr id="5" name="Picture 4"/>
+            <p:cNvPicPr>
+              <a:picLocks/>
+            </p:cNvPicPr>
+            <p:nvPr/>
+          </p:nvPicPr>
+          <p:blipFill>
+            <a:blip r:embed="rId11">
+              <a:extLst>
+                <a:ext uri="{28A0092B-C50C-407E-A947-70E740481C1C}">
+                  <a14:useLocalDpi xmlns:a14="http://schemas.microsoft.com/office/drawing/2010/main" val="0"/>
+                </a:ext>
+              </a:extLst>
+            </a:blip>
+            <a:stretch>
+              <a:fillRect/>
+            </a:stretch>
+          </p:blipFill>
+          <p:spPr>
+            <a:xfrm>
+              <a:off x="19388797" y="26708690"/>
+              <a:ext cx="7315200" cy="2022570"/>
+            </a:xfrm>
+            <a:prstGeom prst="rect">
+              <a:avLst/>
+            </a:prstGeom>
+          </p:spPr>
+        </p:pic>
+        <p:sp>
+          <p:nvSpPr>
+            <p:cNvPr id="99" name="TextBox 98"/>
+            <p:cNvSpPr txBox="1"/>
+            <p:nvPr/>
+          </p:nvSpPr>
+          <p:spPr>
+            <a:xfrm>
+              <a:off x="20796910" y="26731322"/>
+              <a:ext cx="3235570" cy="830997"/>
+            </a:xfrm>
+            <a:prstGeom prst="rect">
+              <a:avLst/>
+            </a:prstGeom>
+            <a:noFill/>
+          </p:spPr>
+          <p:txBody>
+            <a:bodyPr wrap="square" rtlCol="0">
+              <a:spAutoFit/>
+            </a:bodyPr>
+            <a:lstStyle/>
+            <a:p>
+              <a:pPr algn="ctr"/>
+              <a:r>
+                <a:rPr lang="en-US" sz="2400" dirty="0" smtClean="0">
+                  <a:latin typeface="Calibri" charset="0"/>
+                  <a:ea typeface="Calibri" charset="0"/>
+                  <a:cs typeface="Calibri" charset="0"/>
+                </a:rPr>
+                <a:t>Fostoria </a:t>
+              </a:r>
+              <a:br>
+                <a:rPr lang="en-US" sz="2400" dirty="0" smtClean="0">
+                  <a:latin typeface="Calibri" charset="0"/>
+                  <a:ea typeface="Calibri" charset="0"/>
+                  <a:cs typeface="Calibri" charset="0"/>
+                </a:rPr>
+              </a:br>
+              <a:r>
+                <a:rPr lang="en-US" sz="2400" dirty="0" smtClean="0">
+                  <a:latin typeface="Calibri" charset="0"/>
+                  <a:ea typeface="Calibri" charset="0"/>
+                  <a:cs typeface="Calibri" charset="0"/>
+                </a:rPr>
+                <a:t>Defect Distribution </a:t>
+              </a:r>
+              <a:endParaRPr lang="en-US" sz="2400" dirty="0">
+                <a:latin typeface="Calibri" charset="0"/>
+                <a:ea typeface="Calibri" charset="0"/>
+                <a:cs typeface="Calibri" charset="0"/>
+              </a:endParaRPr>
+            </a:p>
+          </p:txBody>
+        </p:sp>
+      </p:grpSp>
+      <p:sp>
+        <p:nvSpPr>
+          <p:cNvPr id="10" name="TextBox 9"/>
+          <p:cNvSpPr txBox="1"/>
+          <p:nvPr/>
+        </p:nvSpPr>
+        <p:spPr>
+          <a:xfrm>
+            <a:off x="13914853" y="20754441"/>
+            <a:ext cx="5915192" cy="2862322"/>
+          </a:xfrm>
+          <a:prstGeom prst="rect">
+            <a:avLst/>
+          </a:prstGeom>
+          <a:noFill/>
+        </p:spPr>
+        <p:txBody>
+          <a:bodyPr wrap="square" rtlCol="0">
+            <a:spAutoFit/>
+          </a:bodyPr>
+          <a:lstStyle/>
+          <a:p>
+            <a:pPr marL="57150" marR="0" lvl="0" indent="-57150" defTabSz="914400" eaLnBrk="1" fontAlgn="auto" latinLnBrk="0" hangingPunct="1">
+              <a:lnSpc>
+                <a:spcPct val="100000"/>
+              </a:lnSpc>
+              <a:spcBef>
+                <a:spcPts val="0"/>
+              </a:spcBef>
+              <a:spcAft>
+                <a:spcPts val="0"/>
+              </a:spcAft>
+              <a:buClrTx/>
+              <a:buSzTx/>
+              <a:buFont typeface="Arial" charset="0"/>
+              <a:buNone/>
+              <a:defRPr/>
+            </a:pPr>
+            <a:r>
+              <a:rPr lang="en-US" sz="3600" dirty="0" smtClean="0">
+                <a:latin typeface="Calibri" charset="0"/>
+                <a:ea typeface="Calibri" charset="0"/>
+                <a:cs typeface="Calibri" charset="0"/>
+              </a:rPr>
+              <a:t>How do subdivisions’ defect distributions compare:</a:t>
+            </a:r>
+          </a:p>
+          <a:p>
+            <a:pPr marL="571500" marR="0" lvl="0" indent="-571500" defTabSz="914400" eaLnBrk="1" fontAlgn="auto" latinLnBrk="0" hangingPunct="1">
+              <a:lnSpc>
+                <a:spcPct val="100000"/>
+              </a:lnSpc>
+              <a:spcBef>
+                <a:spcPts val="0"/>
+              </a:spcBef>
+              <a:spcAft>
+                <a:spcPts val="0"/>
+              </a:spcAft>
+              <a:buClrTx/>
+              <a:buSzTx/>
+              <a:buFont typeface="Arial" charset="0"/>
+              <a:buChar char="•"/>
+              <a:tabLst/>
+              <a:defRPr/>
+            </a:pPr>
+            <a:r>
+              <a:rPr lang="en-US" sz="3600" dirty="0" smtClean="0">
+                <a:latin typeface="Calibri" charset="0"/>
+                <a:ea typeface="Calibri" charset="0"/>
+                <a:cs typeface="Calibri" charset="0"/>
+              </a:rPr>
+              <a:t>To each other?</a:t>
+            </a:r>
+          </a:p>
+          <a:p>
+            <a:pPr marL="571500" marR="0" lvl="0" indent="-571500" defTabSz="914400" eaLnBrk="1" fontAlgn="auto" latinLnBrk="0" hangingPunct="1">
+              <a:lnSpc>
+                <a:spcPct val="100000"/>
+              </a:lnSpc>
+              <a:spcBef>
+                <a:spcPts val="0"/>
+              </a:spcBef>
+              <a:spcAft>
+                <a:spcPts val="0"/>
+              </a:spcAft>
+              <a:buClrTx/>
+              <a:buSzTx/>
+              <a:buFont typeface="Arial" charset="0"/>
+              <a:buChar char="•"/>
+              <a:tabLst/>
+              <a:defRPr/>
+            </a:pPr>
+            <a:r>
+              <a:rPr lang="en-US" sz="3600" dirty="0" smtClean="0">
+                <a:latin typeface="Calibri" charset="0"/>
+                <a:ea typeface="Calibri" charset="0"/>
+                <a:cs typeface="Calibri" charset="0"/>
+              </a:rPr>
+              <a:t>To the global distribution?</a:t>
+            </a:r>
+          </a:p>
+          <a:p>
+            <a:pPr marR="0" lvl="0" defTabSz="914400" eaLnBrk="1" fontAlgn="auto" latinLnBrk="0" hangingPunct="1">
+              <a:lnSpc>
+                <a:spcPct val="100000"/>
+              </a:lnSpc>
+              <a:spcBef>
+                <a:spcPts val="0"/>
+              </a:spcBef>
+              <a:spcAft>
+                <a:spcPts val="0"/>
+              </a:spcAft>
+              <a:buClrTx/>
+              <a:buSzTx/>
+              <a:tabLst/>
+              <a:defRPr/>
+            </a:pPr>
+            <a:endParaRPr lang="en-US" sz="3600" dirty="0">
+              <a:latin typeface="Calibri" charset="0"/>
+              <a:ea typeface="Calibri" charset="0"/>
+              <a:cs typeface="Calibri" charset="0"/>
+            </a:endParaRPr>
+          </a:p>
+        </p:txBody>
+      </p:sp>
+      <p:sp>
+        <p:nvSpPr>
+          <p:cNvPr id="102" name="Rectangle 101"/>
+          <p:cNvSpPr/>
+          <p:nvPr/>
+        </p:nvSpPr>
+        <p:spPr>
+          <a:xfrm>
+            <a:off x="16248091" y="24336987"/>
+            <a:ext cx="559477" cy="286653"/>
+          </a:xfrm>
+          <a:prstGeom prst="rect">
+            <a:avLst/>
+          </a:prstGeom>
+          <a:noFill/>
+          <a:ln w="50800">
+            <a:solidFill>
+              <a:schemeClr val="accent2"/>
+            </a:solidFill>
+          </a:ln>
+          <a:effectLst>
+            <a:glow rad="228600">
+              <a:schemeClr val="accent2">
+                <a:satMod val="175000"/>
+                <a:alpha val="40000"/>
+              </a:schemeClr>
+            </a:glow>
+          </a:effectLst>
+        </p:spPr>
+        <p:style>
+          <a:lnRef idx="2">
+            <a:schemeClr val="accent1">
+              <a:shade val="50000"/>
+            </a:schemeClr>
+          </a:lnRef>
+          <a:fillRef idx="1">
+            <a:schemeClr val="accent1"/>
+          </a:fillRef>
+          <a:effectRef idx="0">
+            <a:schemeClr val="accent1"/>
+          </a:effectRef>
+          <a:fontRef idx="minor">
+            <a:schemeClr val="lt1"/>
+          </a:fontRef>
+        </p:style>
+        <p:txBody>
+          <a:bodyPr rtlCol="0" anchor="ctr"/>
+          <a:lstStyle/>
+          <a:p>
+            <a:pPr algn="ctr"/>
+            <a:endParaRPr lang="en-US"/>
+          </a:p>
+        </p:txBody>
+      </p:sp>
+      <p:sp>
+        <p:nvSpPr>
+          <p:cNvPr id="103" name="TextBox 102"/>
+          <p:cNvSpPr txBox="1"/>
+          <p:nvPr/>
+        </p:nvSpPr>
+        <p:spPr>
+          <a:xfrm>
+            <a:off x="14560510" y="24410021"/>
+            <a:ext cx="1684531" cy="461665"/>
+          </a:xfrm>
+          <a:prstGeom prst="rect">
+            <a:avLst/>
+          </a:prstGeom>
+          <a:noFill/>
+        </p:spPr>
+        <p:txBody>
+          <a:bodyPr wrap="square" rtlCol="0">
+            <a:spAutoFit/>
+          </a:bodyPr>
+          <a:lstStyle/>
+          <a:p>
+            <a:r>
+              <a:rPr lang="en-US" sz="2400" dirty="0" smtClean="0">
+                <a:latin typeface="Calibri" charset="0"/>
+                <a:ea typeface="Calibri" charset="0"/>
+                <a:cs typeface="Calibri" charset="0"/>
+              </a:rPr>
+              <a:t>Pemberville</a:t>
+            </a:r>
+            <a:endParaRPr lang="en-US" sz="2400" dirty="0">
+              <a:latin typeface="Calibri" charset="0"/>
+              <a:ea typeface="Calibri" charset="0"/>
+              <a:cs typeface="Calibri" charset="0"/>
+            </a:endParaRPr>
+          </a:p>
+        </p:txBody>
+      </p:sp>
+      <p:sp>
+        <p:nvSpPr>
+          <p:cNvPr id="104" name="Right Arrow 103"/>
+          <p:cNvSpPr/>
+          <p:nvPr/>
+        </p:nvSpPr>
+        <p:spPr>
+          <a:xfrm rot="2100000">
+            <a:off x="16799226" y="25385348"/>
+            <a:ext cx="2679206" cy="337944"/>
+          </a:xfrm>
+          <a:prstGeom prst="rightArrow">
+            <a:avLst/>
+          </a:prstGeom>
+          <a:solidFill>
+            <a:schemeClr val="accent2"/>
+          </a:solidFill>
+          <a:ln>
+            <a:solidFill>
+              <a:schemeClr val="accent2"/>
+            </a:solidFill>
+          </a:ln>
+        </p:spPr>
+        <p:style>
+          <a:lnRef idx="2">
+            <a:schemeClr val="accent1">
+              <a:shade val="50000"/>
+            </a:schemeClr>
+          </a:lnRef>
+          <a:fillRef idx="1">
+            <a:schemeClr val="accent1"/>
+          </a:fillRef>
+          <a:effectRef idx="0">
+            <a:schemeClr val="accent1"/>
+          </a:effectRef>
+          <a:fontRef idx="minor">
+            <a:schemeClr val="lt1"/>
+          </a:fontRef>
+        </p:style>
+        <p:txBody>
+          <a:bodyPr rtlCol="0" anchor="ctr"/>
+          <a:lstStyle/>
+          <a:p>
+            <a:pPr algn="ctr"/>
+            <a:endParaRPr lang="en-US"/>
+          </a:p>
+        </p:txBody>
+      </p:sp>
+      <p:grpSp>
+        <p:nvGrpSpPr>
+          <p:cNvPr id="24" name="Group 23"/>
+          <p:cNvGrpSpPr/>
+          <p:nvPr/>
+        </p:nvGrpSpPr>
+        <p:grpSpPr>
+          <a:xfrm>
+            <a:off x="19370106" y="25876758"/>
+            <a:ext cx="7534047" cy="2199169"/>
+            <a:chOff x="19395631" y="24143814"/>
+            <a:chExt cx="7534047" cy="2199169"/>
+          </a:xfrm>
+        </p:grpSpPr>
+        <p:pic>
+          <p:nvPicPr>
+            <p:cNvPr id="14" name="Picture 13"/>
+            <p:cNvPicPr>
+              <a:picLocks/>
+            </p:cNvPicPr>
+            <p:nvPr/>
+          </p:nvPicPr>
+          <p:blipFill>
+            <a:blip r:embed="rId12">
+              <a:extLst>
+                <a:ext uri="{28A0092B-C50C-407E-A947-70E740481C1C}">
+                  <a14:useLocalDpi xmlns:a14="http://schemas.microsoft.com/office/drawing/2010/main" val="0"/>
+                </a:ext>
+              </a:extLst>
+            </a:blip>
+            <a:stretch>
+              <a:fillRect/>
+            </a:stretch>
+          </p:blipFill>
+          <p:spPr>
+            <a:xfrm>
+              <a:off x="19395631" y="24143814"/>
+              <a:ext cx="7315200" cy="2199169"/>
+            </a:xfrm>
+            <a:prstGeom prst="rect">
+              <a:avLst/>
+            </a:prstGeom>
+          </p:spPr>
+        </p:pic>
+        <p:sp>
+          <p:nvSpPr>
+            <p:cNvPr id="105" name="TextBox 104"/>
+            <p:cNvSpPr txBox="1"/>
+            <p:nvPr/>
+          </p:nvSpPr>
+          <p:spPr>
+            <a:xfrm>
+              <a:off x="24158956" y="24264599"/>
+              <a:ext cx="2770722" cy="830997"/>
+            </a:xfrm>
+            <a:prstGeom prst="rect">
+              <a:avLst/>
+            </a:prstGeom>
+            <a:noFill/>
+          </p:spPr>
+          <p:txBody>
+            <a:bodyPr wrap="square" rtlCol="0">
+              <a:spAutoFit/>
+            </a:bodyPr>
+            <a:lstStyle/>
+            <a:p>
+              <a:r>
+                <a:rPr lang="en-US" sz="2400" dirty="0" smtClean="0">
+                  <a:latin typeface="Calibri" charset="0"/>
+                  <a:ea typeface="Calibri" charset="0"/>
+                  <a:cs typeface="Calibri" charset="0"/>
+                </a:rPr>
+                <a:t>Pemberville</a:t>
+              </a:r>
+              <a:br>
+                <a:rPr lang="en-US" sz="2400" dirty="0" smtClean="0">
+                  <a:latin typeface="Calibri" charset="0"/>
+                  <a:ea typeface="Calibri" charset="0"/>
+                  <a:cs typeface="Calibri" charset="0"/>
+                </a:rPr>
+              </a:br>
+              <a:r>
+                <a:rPr lang="en-US" sz="2400" smtClean="0">
+                  <a:latin typeface="Calibri" charset="0"/>
+                  <a:ea typeface="Calibri" charset="0"/>
+                  <a:cs typeface="Calibri" charset="0"/>
+                </a:rPr>
+                <a:t>Defect Distribution</a:t>
+              </a:r>
+              <a:endParaRPr lang="en-US" sz="2400" dirty="0">
+                <a:latin typeface="Calibri" charset="0"/>
+                <a:ea typeface="Calibri" charset="0"/>
+                <a:cs typeface="Calibri" charset="0"/>
+              </a:endParaRPr>
+            </a:p>
+          </p:txBody>
+        </p:sp>
+      </p:grpSp>
+      <p:sp>
+        <p:nvSpPr>
+          <p:cNvPr id="106" name="TextBox 105"/>
+          <p:cNvSpPr txBox="1"/>
+          <p:nvPr/>
+        </p:nvSpPr>
+        <p:spPr>
+          <a:xfrm>
+            <a:off x="20338253" y="31475283"/>
+            <a:ext cx="6993382" cy="3416320"/>
+          </a:xfrm>
+          <a:prstGeom prst="rect">
+            <a:avLst/>
+          </a:prstGeom>
+          <a:noFill/>
+        </p:spPr>
+        <p:txBody>
+          <a:bodyPr wrap="square" rtlCol="0">
+            <a:spAutoFit/>
+          </a:bodyPr>
+          <a:lstStyle/>
+          <a:p>
+            <a:pPr marL="233363" marR="0" lvl="0" indent="-233363" defTabSz="914400" eaLnBrk="1" fontAlgn="auto" latinLnBrk="0" hangingPunct="1">
+              <a:lnSpc>
+                <a:spcPct val="100000"/>
+              </a:lnSpc>
+              <a:spcBef>
+                <a:spcPts val="0"/>
+              </a:spcBef>
+              <a:spcAft>
+                <a:spcPts val="0"/>
+              </a:spcAft>
+              <a:buClrTx/>
+              <a:buSzTx/>
+              <a:buFont typeface="Arial" charset="0"/>
+              <a:buChar char="•"/>
+              <a:defRPr/>
+            </a:pPr>
+            <a:r>
+              <a:rPr lang="en-US" sz="3600" dirty="0" smtClean="0">
+                <a:latin typeface="Calibri" charset="0"/>
+                <a:ea typeface="Calibri" charset="0"/>
+                <a:cs typeface="Calibri" charset="0"/>
+              </a:rPr>
+              <a:t>We measure subdivision similarity by chi-square distance between defect distributions </a:t>
+            </a:r>
+          </a:p>
+          <a:p>
+            <a:pPr marL="233363" marR="0" lvl="0" indent="-233363" defTabSz="914400" eaLnBrk="1" fontAlgn="auto" latinLnBrk="0" hangingPunct="1">
+              <a:lnSpc>
+                <a:spcPct val="100000"/>
+              </a:lnSpc>
+              <a:spcBef>
+                <a:spcPts val="0"/>
+              </a:spcBef>
+              <a:spcAft>
+                <a:spcPts val="0"/>
+              </a:spcAft>
+              <a:buClrTx/>
+              <a:buSzTx/>
+              <a:buFont typeface="Arial" charset="0"/>
+              <a:buChar char="•"/>
+              <a:defRPr/>
+            </a:pPr>
+            <a:r>
+              <a:rPr lang="en-US" sz="3600" dirty="0" smtClean="0">
+                <a:latin typeface="Calibri" charset="0"/>
+                <a:ea typeface="Calibri" charset="0"/>
+                <a:cs typeface="Calibri" charset="0"/>
+              </a:rPr>
+              <a:t>Geographically close subdivisions have similar defect distributions</a:t>
+            </a:r>
+          </a:p>
+          <a:p>
+            <a:pPr marR="0" lvl="0" defTabSz="914400" eaLnBrk="1" fontAlgn="auto" latinLnBrk="0" hangingPunct="1">
+              <a:lnSpc>
+                <a:spcPct val="100000"/>
+              </a:lnSpc>
+              <a:spcBef>
+                <a:spcPts val="0"/>
+              </a:spcBef>
+              <a:spcAft>
+                <a:spcPts val="0"/>
+              </a:spcAft>
+              <a:buClrTx/>
+              <a:buSzTx/>
+              <a:tabLst/>
+              <a:defRPr/>
+            </a:pPr>
+            <a:endParaRPr lang="en-US" sz="3600" dirty="0">
+              <a:latin typeface="Calibri" charset="0"/>
+              <a:ea typeface="Calibri" charset="0"/>
+              <a:cs typeface="Calibri" charset="0"/>
+            </a:endParaRPr>
+          </a:p>
+        </p:txBody>
+      </p:sp>
     </p:spTree>
   </p:cSld>
   <p:clrMapOvr>

</xml_diff>